<commit_message>
add profile in drawer and edit image in power point(IB)
</commit_message>
<xml_diff>
--- a/Snap-Shop.pptx
+++ b/Snap-Shop.pptx
@@ -36,11 +36,11 @@
   <p:notesSz cx="6858000" cy="9144000"/>
   <p:embeddedFontLst>
     <p:embeddedFont>
-      <p:font typeface="Canva Sans Bold" charset="0"/>
+      <p:font typeface="Raleway Bold" charset="0"/>
       <p:regular r:id="rId26"/>
     </p:embeddedFont>
     <p:embeddedFont>
-      <p:font typeface="Raleway Bold" charset="0"/>
+      <p:font typeface="Canva Sans Bold" charset="0"/>
       <p:regular r:id="rId27"/>
     </p:embeddedFont>
     <p:embeddedFont>
@@ -231,7 +231,7 @@
           <a:p>
             <a:fld id="{B7268E1E-0E44-426D-905E-8AD9B19D2182}" type="datetimeFigureOut">
               <a:rPr lang="cs-CZ" smtClean="0"/>
-              <a:t>13.10.2024</a:t>
+              <a:t>21.10.2024</a:t>
             </a:fld>
             <a:endParaRPr lang="cs-CZ"/>
           </a:p>
@@ -5411,7 +5411,7 @@
             <a:fld id="{1D8BD707-D9CF-40AE-B4C6-C98DA3205C09}" type="datetimeFigureOut">
               <a:rPr lang="en-US" smtClean="0"/>
               <a:pPr/>
-              <a:t>13-Oct-24</a:t>
+              <a:t>21-Oct-24</a:t>
             </a:fld>
             <a:endParaRPr lang="en-US"/>
           </a:p>
@@ -5578,7 +5578,7 @@
             <a:fld id="{1D8BD707-D9CF-40AE-B4C6-C98DA3205C09}" type="datetimeFigureOut">
               <a:rPr lang="en-US" smtClean="0"/>
               <a:pPr/>
-              <a:t>13-Oct-24</a:t>
+              <a:t>21-Oct-24</a:t>
             </a:fld>
             <a:endParaRPr lang="en-US"/>
           </a:p>
@@ -5755,7 +5755,7 @@
             <a:fld id="{1D8BD707-D9CF-40AE-B4C6-C98DA3205C09}" type="datetimeFigureOut">
               <a:rPr lang="en-US" smtClean="0"/>
               <a:pPr/>
-              <a:t>13-Oct-24</a:t>
+              <a:t>21-Oct-24</a:t>
             </a:fld>
             <a:endParaRPr lang="en-US"/>
           </a:p>
@@ -5922,7 +5922,7 @@
             <a:fld id="{1D8BD707-D9CF-40AE-B4C6-C98DA3205C09}" type="datetimeFigureOut">
               <a:rPr lang="en-US" smtClean="0"/>
               <a:pPr/>
-              <a:t>13-Oct-24</a:t>
+              <a:t>21-Oct-24</a:t>
             </a:fld>
             <a:endParaRPr lang="en-US"/>
           </a:p>
@@ -6165,7 +6165,7 @@
             <a:fld id="{1D8BD707-D9CF-40AE-B4C6-C98DA3205C09}" type="datetimeFigureOut">
               <a:rPr lang="en-US" smtClean="0"/>
               <a:pPr/>
-              <a:t>13-Oct-24</a:t>
+              <a:t>21-Oct-24</a:t>
             </a:fld>
             <a:endParaRPr lang="en-US"/>
           </a:p>
@@ -6450,7 +6450,7 @@
             <a:fld id="{1D8BD707-D9CF-40AE-B4C6-C98DA3205C09}" type="datetimeFigureOut">
               <a:rPr lang="en-US" smtClean="0"/>
               <a:pPr/>
-              <a:t>13-Oct-24</a:t>
+              <a:t>21-Oct-24</a:t>
             </a:fld>
             <a:endParaRPr lang="en-US"/>
           </a:p>
@@ -6869,7 +6869,7 @@
             <a:fld id="{1D8BD707-D9CF-40AE-B4C6-C98DA3205C09}" type="datetimeFigureOut">
               <a:rPr lang="en-US" smtClean="0"/>
               <a:pPr/>
-              <a:t>13-Oct-24</a:t>
+              <a:t>21-Oct-24</a:t>
             </a:fld>
             <a:endParaRPr lang="en-US"/>
           </a:p>
@@ -6984,7 +6984,7 @@
             <a:fld id="{1D8BD707-D9CF-40AE-B4C6-C98DA3205C09}" type="datetimeFigureOut">
               <a:rPr lang="en-US" smtClean="0"/>
               <a:pPr/>
-              <a:t>13-Oct-24</a:t>
+              <a:t>21-Oct-24</a:t>
             </a:fld>
             <a:endParaRPr lang="en-US"/>
           </a:p>
@@ -7076,7 +7076,7 @@
             <a:fld id="{1D8BD707-D9CF-40AE-B4C6-C98DA3205C09}" type="datetimeFigureOut">
               <a:rPr lang="en-US" smtClean="0"/>
               <a:pPr/>
-              <a:t>13-Oct-24</a:t>
+              <a:t>21-Oct-24</a:t>
             </a:fld>
             <a:endParaRPr lang="en-US"/>
           </a:p>
@@ -7350,7 +7350,7 @@
             <a:fld id="{1D8BD707-D9CF-40AE-B4C6-C98DA3205C09}" type="datetimeFigureOut">
               <a:rPr lang="en-US" smtClean="0"/>
               <a:pPr/>
-              <a:t>13-Oct-24</a:t>
+              <a:t>21-Oct-24</a:t>
             </a:fld>
             <a:endParaRPr lang="en-US"/>
           </a:p>
@@ -7600,7 +7600,7 @@
             <a:fld id="{1D8BD707-D9CF-40AE-B4C6-C98DA3205C09}" type="datetimeFigureOut">
               <a:rPr lang="en-US" smtClean="0"/>
               <a:pPr/>
-              <a:t>13-Oct-24</a:t>
+              <a:t>21-Oct-24</a:t>
             </a:fld>
             <a:endParaRPr lang="en-US"/>
           </a:p>
@@ -7810,7 +7810,7 @@
             <a:fld id="{1D8BD707-D9CF-40AE-B4C6-C98DA3205C09}" type="datetimeFigureOut">
               <a:rPr lang="en-US" smtClean="0"/>
               <a:pPr/>
-              <a:t>13-Oct-24</a:t>
+              <a:t>21-Oct-24</a:t>
             </a:fld>
             <a:endParaRPr lang="en-US"/>
           </a:p>
@@ -8231,7 +8231,7 @@
             <a:blip r:embed="rId3">
               <a:extLst>
                 <a:ext uri="{96DAC541-7B7A-43D3-8B79-37D633B846F1}">
-                  <asvg:svgBlip xmlns="" xmlns:asvg="http://schemas.microsoft.com/office/drawing/2016/SVG/main" r:embed="rId4"/>
+                  <asvg:svgBlip xmlns:asvg="http://schemas.microsoft.com/office/drawing/2016/SVG/main" xmlns="" r:embed="rId4"/>
                 </a:ext>
               </a:extLst>
             </a:blip>
@@ -8283,7 +8283,7 @@
             <a:blip r:embed="rId5">
               <a:extLst>
                 <a:ext uri="{96DAC541-7B7A-43D3-8B79-37D633B846F1}">
-                  <asvg:svgBlip xmlns="" xmlns:asvg="http://schemas.microsoft.com/office/drawing/2016/SVG/main" r:embed="rId6"/>
+                  <asvg:svgBlip xmlns:asvg="http://schemas.microsoft.com/office/drawing/2016/SVG/main" xmlns="" r:embed="rId6"/>
                 </a:ext>
               </a:extLst>
             </a:blip>
@@ -8335,7 +8335,7 @@
             <a:blip r:embed="rId7">
               <a:extLst>
                 <a:ext uri="{96DAC541-7B7A-43D3-8B79-37D633B846F1}">
-                  <asvg:svgBlip xmlns="" xmlns:asvg="http://schemas.microsoft.com/office/drawing/2016/SVG/main" r:embed="rId8"/>
+                  <asvg:svgBlip xmlns:asvg="http://schemas.microsoft.com/office/drawing/2016/SVG/main" xmlns="" r:embed="rId8"/>
                 </a:ext>
               </a:extLst>
             </a:blip>
@@ -8387,7 +8387,7 @@
             <a:blip r:embed="rId9">
               <a:extLst>
                 <a:ext uri="{96DAC541-7B7A-43D3-8B79-37D633B846F1}">
-                  <asvg:svgBlip xmlns="" xmlns:asvg="http://schemas.microsoft.com/office/drawing/2016/SVG/main" r:embed="rId10"/>
+                  <asvg:svgBlip xmlns:asvg="http://schemas.microsoft.com/office/drawing/2016/SVG/main" xmlns="" r:embed="rId10"/>
                 </a:ext>
               </a:extLst>
             </a:blip>
@@ -8439,7 +8439,7 @@
             <a:blip r:embed="rId11">
               <a:extLst>
                 <a:ext uri="{96DAC541-7B7A-43D3-8B79-37D633B846F1}">
-                  <asvg:svgBlip xmlns="" xmlns:asvg="http://schemas.microsoft.com/office/drawing/2016/SVG/main" r:embed="rId12"/>
+                  <asvg:svgBlip xmlns:asvg="http://schemas.microsoft.com/office/drawing/2016/SVG/main" xmlns="" r:embed="rId12"/>
                 </a:ext>
               </a:extLst>
             </a:blip>
@@ -8491,7 +8491,7 @@
             <a:blip r:embed="rId13">
               <a:extLst>
                 <a:ext uri="{96DAC541-7B7A-43D3-8B79-37D633B846F1}">
-                  <asvg:svgBlip xmlns="" xmlns:asvg="http://schemas.microsoft.com/office/drawing/2016/SVG/main" r:embed="rId14"/>
+                  <asvg:svgBlip xmlns:asvg="http://schemas.microsoft.com/office/drawing/2016/SVG/main" xmlns="" r:embed="rId14"/>
                 </a:ext>
               </a:extLst>
             </a:blip>
@@ -8543,7 +8543,7 @@
             <a:blip r:embed="rId15">
               <a:extLst>
                 <a:ext uri="{96DAC541-7B7A-43D3-8B79-37D633B846F1}">
-                  <asvg:svgBlip xmlns="" xmlns:asvg="http://schemas.microsoft.com/office/drawing/2016/SVG/main" r:embed="rId16"/>
+                  <asvg:svgBlip xmlns:asvg="http://schemas.microsoft.com/office/drawing/2016/SVG/main" xmlns="" r:embed="rId16"/>
                 </a:ext>
               </a:extLst>
             </a:blip>
@@ -8595,7 +8595,7 @@
             <a:blip r:embed="rId17">
               <a:extLst>
                 <a:ext uri="{96DAC541-7B7A-43D3-8B79-37D633B846F1}">
-                  <asvg:svgBlip xmlns="" xmlns:asvg="http://schemas.microsoft.com/office/drawing/2016/SVG/main" r:embed="rId18"/>
+                  <asvg:svgBlip xmlns:asvg="http://schemas.microsoft.com/office/drawing/2016/SVG/main" xmlns="" r:embed="rId18"/>
                 </a:ext>
               </a:extLst>
             </a:blip>
@@ -8647,7 +8647,7 @@
             <a:blip r:embed="rId19">
               <a:extLst>
                 <a:ext uri="{96DAC541-7B7A-43D3-8B79-37D633B846F1}">
-                  <asvg:svgBlip xmlns="" xmlns:asvg="http://schemas.microsoft.com/office/drawing/2016/SVG/main" r:embed="rId20"/>
+                  <asvg:svgBlip xmlns:asvg="http://schemas.microsoft.com/office/drawing/2016/SVG/main" xmlns="" r:embed="rId20"/>
                 </a:ext>
               </a:extLst>
             </a:blip>
@@ -8699,7 +8699,7 @@
             <a:blip r:embed="rId21">
               <a:extLst>
                 <a:ext uri="{96DAC541-7B7A-43D3-8B79-37D633B846F1}">
-                  <asvg:svgBlip xmlns="" xmlns:asvg="http://schemas.microsoft.com/office/drawing/2016/SVG/main" r:embed="rId22"/>
+                  <asvg:svgBlip xmlns:asvg="http://schemas.microsoft.com/office/drawing/2016/SVG/main" xmlns="" r:embed="rId22"/>
                 </a:ext>
               </a:extLst>
             </a:blip>
@@ -9024,7 +9024,7 @@
             <a:blip r:embed="rId23">
               <a:extLst>
                 <a:ext uri="{96DAC541-7B7A-43D3-8B79-37D633B846F1}">
-                  <asvg:svgBlip xmlns="" xmlns:asvg="http://schemas.microsoft.com/office/drawing/2016/SVG/main" r:embed="rId24"/>
+                  <asvg:svgBlip xmlns:asvg="http://schemas.microsoft.com/office/drawing/2016/SVG/main" xmlns="" r:embed="rId24"/>
                 </a:ext>
               </a:extLst>
             </a:blip>
@@ -9076,7 +9076,7 @@
             <a:blip r:embed="rId25">
               <a:extLst>
                 <a:ext uri="{96DAC541-7B7A-43D3-8B79-37D633B846F1}">
-                  <asvg:svgBlip xmlns="" xmlns:asvg="http://schemas.microsoft.com/office/drawing/2016/SVG/main" r:embed="rId26"/>
+                  <asvg:svgBlip xmlns:asvg="http://schemas.microsoft.com/office/drawing/2016/SVG/main" xmlns="" r:embed="rId26"/>
                 </a:ext>
               </a:extLst>
             </a:blip>
@@ -9128,7 +9128,7 @@
             <a:blip r:embed="rId27">
               <a:extLst>
                 <a:ext uri="{96DAC541-7B7A-43D3-8B79-37D633B846F1}">
-                  <asvg:svgBlip xmlns="" xmlns:asvg="http://schemas.microsoft.com/office/drawing/2016/SVG/main" r:embed="rId28"/>
+                  <asvg:svgBlip xmlns:asvg="http://schemas.microsoft.com/office/drawing/2016/SVG/main" xmlns="" r:embed="rId28"/>
                 </a:ext>
               </a:extLst>
             </a:blip>
@@ -9180,7 +9180,7 @@
             <a:blip r:embed="rId29">
               <a:extLst>
                 <a:ext uri="{96DAC541-7B7A-43D3-8B79-37D633B846F1}">
-                  <asvg:svgBlip xmlns="" xmlns:asvg="http://schemas.microsoft.com/office/drawing/2016/SVG/main" r:embed="rId30"/>
+                  <asvg:svgBlip xmlns:asvg="http://schemas.microsoft.com/office/drawing/2016/SVG/main" xmlns="" r:embed="rId30"/>
                 </a:ext>
               </a:extLst>
             </a:blip>
@@ -9232,7 +9232,7 @@
             <a:blip r:embed="rId31">
               <a:extLst>
                 <a:ext uri="{96DAC541-7B7A-43D3-8B79-37D633B846F1}">
-                  <asvg:svgBlip xmlns="" xmlns:asvg="http://schemas.microsoft.com/office/drawing/2016/SVG/main" r:embed="rId32"/>
+                  <asvg:svgBlip xmlns:asvg="http://schemas.microsoft.com/office/drawing/2016/SVG/main" xmlns="" r:embed="rId32"/>
                 </a:ext>
               </a:extLst>
             </a:blip>
@@ -9284,7 +9284,7 @@
             <a:blip r:embed="rId33">
               <a:extLst>
                 <a:ext uri="{96DAC541-7B7A-43D3-8B79-37D633B846F1}">
-                  <asvg:svgBlip xmlns="" xmlns:asvg="http://schemas.microsoft.com/office/drawing/2016/SVG/main" r:embed="rId34"/>
+                  <asvg:svgBlip xmlns:asvg="http://schemas.microsoft.com/office/drawing/2016/SVG/main" xmlns="" r:embed="rId34"/>
                 </a:ext>
               </a:extLst>
             </a:blip>
@@ -9336,7 +9336,7 @@
             <a:blip r:embed="rId35">
               <a:extLst>
                 <a:ext uri="{96DAC541-7B7A-43D3-8B79-37D633B846F1}">
-                  <asvg:svgBlip xmlns="" xmlns:asvg="http://schemas.microsoft.com/office/drawing/2016/SVG/main" r:embed="rId36"/>
+                  <asvg:svgBlip xmlns:asvg="http://schemas.microsoft.com/office/drawing/2016/SVG/main" xmlns="" r:embed="rId36"/>
                 </a:ext>
               </a:extLst>
             </a:blip>
@@ -9388,7 +9388,7 @@
             <a:blip r:embed="rId37">
               <a:extLst>
                 <a:ext uri="{96DAC541-7B7A-43D3-8B79-37D633B846F1}">
-                  <asvg:svgBlip xmlns="" xmlns:asvg="http://schemas.microsoft.com/office/drawing/2016/SVG/main" r:embed="rId38"/>
+                  <asvg:svgBlip xmlns:asvg="http://schemas.microsoft.com/office/drawing/2016/SVG/main" xmlns="" r:embed="rId38"/>
                 </a:ext>
               </a:extLst>
             </a:blip>
@@ -9622,7 +9622,7 @@
             <a:blip r:embed="rId39">
               <a:extLst>
                 <a:ext uri="{96DAC541-7B7A-43D3-8B79-37D633B846F1}">
-                  <asvg:svgBlip xmlns="" xmlns:asvg="http://schemas.microsoft.com/office/drawing/2016/SVG/main" r:embed="rId40"/>
+                  <asvg:svgBlip xmlns:asvg="http://schemas.microsoft.com/office/drawing/2016/SVG/main" xmlns="" r:embed="rId40"/>
                 </a:ext>
               </a:extLst>
             </a:blip>
@@ -10045,7 +10045,7 @@
             <a:blip r:embed="rId41">
               <a:extLst>
                 <a:ext uri="{96DAC541-7B7A-43D3-8B79-37D633B846F1}">
-                  <asvg:svgBlip xmlns="" xmlns:asvg="http://schemas.microsoft.com/office/drawing/2016/SVG/main" r:embed="rId42"/>
+                  <asvg:svgBlip xmlns:asvg="http://schemas.microsoft.com/office/drawing/2016/SVG/main" xmlns="" r:embed="rId42"/>
                 </a:ext>
               </a:extLst>
             </a:blip>
@@ -10097,7 +10097,7 @@
             <a:blip r:embed="rId43">
               <a:extLst>
                 <a:ext uri="{96DAC541-7B7A-43D3-8B79-37D633B846F1}">
-                  <asvg:svgBlip xmlns="" xmlns:asvg="http://schemas.microsoft.com/office/drawing/2016/SVG/main" r:embed="rId44"/>
+                  <asvg:svgBlip xmlns:asvg="http://schemas.microsoft.com/office/drawing/2016/SVG/main" xmlns="" r:embed="rId44"/>
                 </a:ext>
               </a:extLst>
             </a:blip>
@@ -10374,7 +10374,7 @@
             <a:blip r:embed="rId45">
               <a:extLst>
                 <a:ext uri="{96DAC541-7B7A-43D3-8B79-37D633B846F1}">
-                  <asvg:svgBlip xmlns="" xmlns:asvg="http://schemas.microsoft.com/office/drawing/2016/SVG/main" r:embed="rId46"/>
+                  <asvg:svgBlip xmlns:asvg="http://schemas.microsoft.com/office/drawing/2016/SVG/main" xmlns="" r:embed="rId46"/>
                 </a:ext>
               </a:extLst>
             </a:blip>
@@ -11017,7 +11017,7 @@
             <a:blip r:embed="rId3">
               <a:extLst>
                 <a:ext uri="{96DAC541-7B7A-43D3-8B79-37D633B846F1}">
-                  <asvg:svgBlip xmlns="" xmlns:asvg="http://schemas.microsoft.com/office/drawing/2016/SVG/main" r:embed="rId4"/>
+                  <asvg:svgBlip xmlns:asvg="http://schemas.microsoft.com/office/drawing/2016/SVG/main" xmlns="" r:embed="rId4"/>
                 </a:ext>
               </a:extLst>
             </a:blip>
@@ -11387,7 +11387,7 @@
             <a:blip r:embed="rId3">
               <a:extLst>
                 <a:ext uri="{96DAC541-7B7A-43D3-8B79-37D633B846F1}">
-                  <asvg:svgBlip xmlns="" xmlns:asvg="http://schemas.microsoft.com/office/drawing/2016/SVG/main" r:embed="rId4"/>
+                  <asvg:svgBlip xmlns:asvg="http://schemas.microsoft.com/office/drawing/2016/SVG/main" xmlns="" r:embed="rId4"/>
                 </a:ext>
               </a:extLst>
             </a:blip>
@@ -11808,7 +11808,7 @@
             <a:blip r:embed="rId3">
               <a:extLst>
                 <a:ext uri="{96DAC541-7B7A-43D3-8B79-37D633B846F1}">
-                  <asvg:svgBlip xmlns="" xmlns:asvg="http://schemas.microsoft.com/office/drawing/2016/SVG/main" r:embed="rId4"/>
+                  <asvg:svgBlip xmlns:asvg="http://schemas.microsoft.com/office/drawing/2016/SVG/main" xmlns="" r:embed="rId4"/>
                 </a:ext>
               </a:extLst>
             </a:blip>
@@ -12204,7 +12204,7 @@
             <a:blip r:embed="rId3">
               <a:extLst>
                 <a:ext uri="{96DAC541-7B7A-43D3-8B79-37D633B846F1}">
-                  <asvg:svgBlip xmlns="" xmlns:asvg="http://schemas.microsoft.com/office/drawing/2016/SVG/main" r:embed="rId4"/>
+                  <asvg:svgBlip xmlns:asvg="http://schemas.microsoft.com/office/drawing/2016/SVG/main" xmlns="" r:embed="rId4"/>
                 </a:ext>
               </a:extLst>
             </a:blip>
@@ -12574,7 +12574,7 @@
             <a:blip r:embed="rId3">
               <a:extLst>
                 <a:ext uri="{96DAC541-7B7A-43D3-8B79-37D633B846F1}">
-                  <asvg:svgBlip xmlns="" xmlns:asvg="http://schemas.microsoft.com/office/drawing/2016/SVG/main" r:embed="rId4"/>
+                  <asvg:svgBlip xmlns:asvg="http://schemas.microsoft.com/office/drawing/2016/SVG/main" xmlns="" r:embed="rId4"/>
                 </a:ext>
               </a:extLst>
             </a:blip>
@@ -12944,7 +12944,7 @@
             <a:blip r:embed="rId3">
               <a:extLst>
                 <a:ext uri="{96DAC541-7B7A-43D3-8B79-37D633B846F1}">
-                  <asvg:svgBlip xmlns="" xmlns:asvg="http://schemas.microsoft.com/office/drawing/2016/SVG/main" r:embed="rId4"/>
+                  <asvg:svgBlip xmlns:asvg="http://schemas.microsoft.com/office/drawing/2016/SVG/main" xmlns="" r:embed="rId4"/>
                 </a:ext>
               </a:extLst>
             </a:blip>
@@ -13313,7 +13313,7 @@
             <a:blip r:embed="rId3">
               <a:extLst>
                 <a:ext uri="{96DAC541-7B7A-43D3-8B79-37D633B846F1}">
-                  <asvg:svgBlip xmlns="" xmlns:asvg="http://schemas.microsoft.com/office/drawing/2016/SVG/main" r:embed="rId4"/>
+                  <asvg:svgBlip xmlns:asvg="http://schemas.microsoft.com/office/drawing/2016/SVG/main" xmlns="" r:embed="rId4"/>
                 </a:ext>
               </a:extLst>
             </a:blip>
@@ -13802,7 +13802,7 @@
             <a:blip r:embed="rId3">
               <a:extLst>
                 <a:ext uri="{96DAC541-7B7A-43D3-8B79-37D633B846F1}">
-                  <asvg:svgBlip xmlns="" xmlns:asvg="http://schemas.microsoft.com/office/drawing/2016/SVG/main" r:embed="rId4"/>
+                  <asvg:svgBlip xmlns:asvg="http://schemas.microsoft.com/office/drawing/2016/SVG/main" xmlns="" r:embed="rId4"/>
                 </a:ext>
               </a:extLst>
             </a:blip>
@@ -14195,7 +14195,7 @@
             <a:blip r:embed="rId3">
               <a:extLst>
                 <a:ext uri="{96DAC541-7B7A-43D3-8B79-37D633B846F1}">
-                  <asvg:svgBlip xmlns="" xmlns:asvg="http://schemas.microsoft.com/office/drawing/2016/SVG/main" r:embed="rId4"/>
+                  <asvg:svgBlip xmlns:asvg="http://schemas.microsoft.com/office/drawing/2016/SVG/main" xmlns="" r:embed="rId4"/>
                 </a:ext>
               </a:extLst>
             </a:blip>
@@ -14484,56 +14484,10 @@
             <a:blip r:embed="rId3">
               <a:extLst>
                 <a:ext uri="{96DAC541-7B7A-43D3-8B79-37D633B846F1}">
-                  <asvg:svgBlip xmlns="" xmlns:asvg="http://schemas.microsoft.com/office/drawing/2016/SVG/main" r:embed="rId4"/>
+                  <asvg:svgBlip xmlns:asvg="http://schemas.microsoft.com/office/drawing/2016/SVG/main" xmlns="" r:embed="rId4"/>
                 </a:ext>
               </a:extLst>
             </a:blip>
-            <a:stretch>
-              <a:fillRect/>
-            </a:stretch>
-          </a:blipFill>
-        </p:spPr>
-      </p:sp>
-      <p:sp>
-        <p:nvSpPr>
-          <p:cNvPr id="2" name="Freeform 2"/>
-          <p:cNvSpPr/>
-          <p:nvPr/>
-        </p:nvSpPr>
-        <p:spPr>
-          <a:xfrm>
-            <a:off x="13792200" y="2324100"/>
-            <a:ext cx="3733800" cy="7239000"/>
-          </a:xfrm>
-          <a:custGeom>
-            <a:avLst/>
-            <a:gdLst/>
-            <a:ahLst/>
-            <a:cxnLst/>
-            <a:rect l="l" t="t" r="r" b="b"/>
-            <a:pathLst>
-              <a:path w="3994468" h="8633546">
-                <a:moveTo>
-                  <a:pt x="0" y="0"/>
-                </a:moveTo>
-                <a:lnTo>
-                  <a:pt x="3994468" y="0"/>
-                </a:lnTo>
-                <a:lnTo>
-                  <a:pt x="3994468" y="8633546"/>
-                </a:lnTo>
-                <a:lnTo>
-                  <a:pt x="0" y="8633546"/>
-                </a:lnTo>
-                <a:lnTo>
-                  <a:pt x="0" y="0"/>
-                </a:lnTo>
-                <a:close/>
-              </a:path>
-            </a:pathLst>
-          </a:custGeom>
-          <a:blipFill>
-            <a:blip r:embed="rId5"/>
             <a:stretch>
               <a:fillRect/>
             </a:stretch>
@@ -14743,7 +14697,7 @@
           <p:nvPr/>
         </p:nvPicPr>
         <p:blipFill>
-          <a:blip r:embed="rId6" cstate="print">
+          <a:blip r:embed="rId5" cstate="print">
             <a:extLst>
               <a:ext uri="{28A0092B-C50C-407E-A947-70E740481C1C}">
                 <a14:useLocalDpi xmlns:a14="http://schemas.microsoft.com/office/drawing/2010/main" val="0"/>
@@ -14771,6 +14725,70 @@
                   <a:srgbClr val="FFFFFF"/>
                 </a:solidFill>
               </a14:hiddenFill>
+            </a:ext>
+          </a:extLst>
+        </p:spPr>
+      </p:pic>
+      <p:pic>
+        <p:nvPicPr>
+          <p:cNvPr id="1026" name="Picture 2"/>
+          <p:cNvPicPr>
+            <a:picLocks noChangeAspect="1" noChangeArrowheads="1"/>
+          </p:cNvPicPr>
+          <p:nvPr/>
+        </p:nvPicPr>
+        <p:blipFill>
+          <a:blip r:embed="rId6">
+            <a:extLst>
+              <a:ext uri="{28A0092B-C50C-407E-A947-70E740481C1C}">
+                <a14:useLocalDpi xmlns:a14="http://schemas.microsoft.com/office/drawing/2010/main" val="0"/>
+              </a:ext>
+            </a:extLst>
+          </a:blip>
+          <a:srcRect/>
+          <a:stretch>
+            <a:fillRect/>
+          </a:stretch>
+        </p:blipFill>
+        <p:spPr bwMode="auto">
+          <a:xfrm>
+            <a:off x="13792200" y="2324100"/>
+            <a:ext cx="4038600" cy="7481362"/>
+          </a:xfrm>
+          <a:prstGeom prst="rect">
+            <a:avLst/>
+          </a:prstGeom>
+          <a:noFill/>
+          <a:ln>
+            <a:noFill/>
+          </a:ln>
+          <a:effectLst/>
+          <a:extLst>
+            <a:ext uri="{909E8E84-426E-40DD-AFC4-6F175D3DCCD1}">
+              <a14:hiddenFill xmlns:a14="http://schemas.microsoft.com/office/drawing/2010/main">
+                <a:solidFill>
+                  <a:schemeClr val="accent1"/>
+                </a:solidFill>
+              </a14:hiddenFill>
+            </a:ext>
+            <a:ext uri="{91240B29-F687-4F45-9708-019B960494DF}">
+              <a14:hiddenLine xmlns:a14="http://schemas.microsoft.com/office/drawing/2010/main" w="9525">
+                <a:solidFill>
+                  <a:schemeClr val="tx1"/>
+                </a:solidFill>
+                <a:miter lim="800000"/>
+                <a:headEnd/>
+                <a:tailEnd/>
+              </a14:hiddenLine>
+            </a:ext>
+            <a:ext uri="{AF507438-7753-43E0-B8FC-AC1667EBCBE1}">
+              <a14:hiddenEffects xmlns:a14="http://schemas.microsoft.com/office/drawing/2010/main">
+                <a:effectLst>
+                  <a:outerShdw dist="35921" dir="2700000" algn="ctr" rotWithShape="0">
+                    <a:schemeClr val="bg2"/>
+                  </a:outerShdw>
+                </a:effectLst>
+              </a14:hiddenEffects>
             </a:ext>
           </a:extLst>
         </p:spPr>
@@ -14850,7 +14868,7 @@
             <a:blip r:embed="rId3">
               <a:extLst>
                 <a:ext uri="{96DAC541-7B7A-43D3-8B79-37D633B846F1}">
-                  <asvg:svgBlip xmlns="" xmlns:asvg="http://schemas.microsoft.com/office/drawing/2016/SVG/main" r:embed="rId4"/>
+                  <asvg:svgBlip xmlns:asvg="http://schemas.microsoft.com/office/drawing/2016/SVG/main" xmlns="" r:embed="rId4"/>
                 </a:ext>
               </a:extLst>
             </a:blip>
@@ -15203,7 +15221,7 @@
             <a:blip r:embed="rId3">
               <a:extLst>
                 <a:ext uri="{96DAC541-7B7A-43D3-8B79-37D633B846F1}">
-                  <asvg:svgBlip xmlns="" xmlns:asvg="http://schemas.microsoft.com/office/drawing/2016/SVG/main" r:embed="rId4"/>
+                  <asvg:svgBlip xmlns:asvg="http://schemas.microsoft.com/office/drawing/2016/SVG/main" xmlns="" r:embed="rId4"/>
                 </a:ext>
               </a:extLst>
             </a:blip>
@@ -15597,7 +15615,7 @@
             <a:blip r:embed="rId3">
               <a:extLst>
                 <a:ext uri="{96DAC541-7B7A-43D3-8B79-37D633B846F1}">
-                  <asvg:svgBlip xmlns="" xmlns:asvg="http://schemas.microsoft.com/office/drawing/2016/SVG/main" r:embed="rId4"/>
+                  <asvg:svgBlip xmlns:asvg="http://schemas.microsoft.com/office/drawing/2016/SVG/main" xmlns="" r:embed="rId4"/>
                 </a:ext>
               </a:extLst>
             </a:blip>
@@ -16087,7 +16105,7 @@
             <a:blip r:embed="rId3">
               <a:extLst>
                 <a:ext uri="{96DAC541-7B7A-43D3-8B79-37D633B846F1}">
-                  <asvg:svgBlip xmlns="" xmlns:asvg="http://schemas.microsoft.com/office/drawing/2016/SVG/main" r:embed="rId4"/>
+                  <asvg:svgBlip xmlns:asvg="http://schemas.microsoft.com/office/drawing/2016/SVG/main" xmlns="" r:embed="rId4"/>
                 </a:ext>
               </a:extLst>
             </a:blip>
@@ -16188,18 +16206,7 @@
                 <a:ea typeface="Canva Sans Bold"/>
                 <a:cs typeface="Canva Sans Bold"/>
               </a:rPr>
-              <a:t>profile screen allows users to manage and view their personal information within the Snap-Shop app. </a:t>
-            </a:r>
-            <a:r>
-              <a:rPr lang="en-US" sz="2211" b="1" dirty="0">
-                <a:solidFill>
-                  <a:srgbClr val="2C115A"/>
-                </a:solidFill>
-                <a:latin typeface="Canva Sans Bold"/>
-                <a:ea typeface="Canva Sans Bold"/>
-                <a:cs typeface="Canva Sans Bold"/>
-              </a:rPr>
-              <a:t>It includes:</a:t>
+              <a:t>profile screen allows users to manage and view their personal information within the Snap-Shop app. It includes:</a:t>
             </a:r>
           </a:p>
           <a:p>
@@ -16436,7 +16443,7 @@
             <a:blip r:embed="rId2">
               <a:extLst>
                 <a:ext uri="{96DAC541-7B7A-43D3-8B79-37D633B846F1}">
-                  <asvg:svgBlip xmlns="" xmlns:asvg="http://schemas.microsoft.com/office/drawing/2016/SVG/main" r:embed="rId4"/>
+                  <asvg:svgBlip xmlns:asvg="http://schemas.microsoft.com/office/drawing/2016/SVG/main" xmlns="" r:embed="rId4"/>
                 </a:ext>
               </a:extLst>
             </a:blip>
@@ -16488,7 +16495,7 @@
             <a:blip r:embed="rId5">
               <a:extLst>
                 <a:ext uri="{96DAC541-7B7A-43D3-8B79-37D633B846F1}">
-                  <asvg:svgBlip xmlns="" xmlns:asvg="http://schemas.microsoft.com/office/drawing/2016/SVG/main" r:embed="rId3"/>
+                  <asvg:svgBlip xmlns:asvg="http://schemas.microsoft.com/office/drawing/2016/SVG/main" xmlns="" r:embed="rId3"/>
                 </a:ext>
               </a:extLst>
             </a:blip>
@@ -16540,7 +16547,7 @@
             <a:blip r:embed="rId6">
               <a:extLst>
                 <a:ext uri="{96DAC541-7B7A-43D3-8B79-37D633B846F1}">
-                  <asvg:svgBlip xmlns="" xmlns:asvg="http://schemas.microsoft.com/office/drawing/2016/SVG/main" r:embed="rId7"/>
+                  <asvg:svgBlip xmlns:asvg="http://schemas.microsoft.com/office/drawing/2016/SVG/main" xmlns="" r:embed="rId7"/>
                 </a:ext>
               </a:extLst>
             </a:blip>
@@ -16592,7 +16599,7 @@
             <a:blip r:embed="rId8">
               <a:extLst>
                 <a:ext uri="{96DAC541-7B7A-43D3-8B79-37D633B846F1}">
-                  <asvg:svgBlip xmlns="" xmlns:asvg="http://schemas.microsoft.com/office/drawing/2016/SVG/main" r:embed="rId9"/>
+                  <asvg:svgBlip xmlns:asvg="http://schemas.microsoft.com/office/drawing/2016/SVG/main" xmlns="" r:embed="rId9"/>
                 </a:ext>
               </a:extLst>
             </a:blip>
@@ -16644,7 +16651,7 @@
             <a:blip r:embed="rId10">
               <a:extLst>
                 <a:ext uri="{96DAC541-7B7A-43D3-8B79-37D633B846F1}">
-                  <asvg:svgBlip xmlns="" xmlns:asvg="http://schemas.microsoft.com/office/drawing/2016/SVG/main" r:embed="rId11"/>
+                  <asvg:svgBlip xmlns:asvg="http://schemas.microsoft.com/office/drawing/2016/SVG/main" xmlns="" r:embed="rId11"/>
                 </a:ext>
               </a:extLst>
             </a:blip>
@@ -16696,7 +16703,7 @@
             <a:blip r:embed="rId12">
               <a:extLst>
                 <a:ext uri="{96DAC541-7B7A-43D3-8B79-37D633B846F1}">
-                  <asvg:svgBlip xmlns="" xmlns:asvg="http://schemas.microsoft.com/office/drawing/2016/SVG/main" r:embed="rId13"/>
+                  <asvg:svgBlip xmlns:asvg="http://schemas.microsoft.com/office/drawing/2016/SVG/main" xmlns="" r:embed="rId13"/>
                 </a:ext>
               </a:extLst>
             </a:blip>
@@ -16748,7 +16755,7 @@
             <a:blip r:embed="rId14">
               <a:extLst>
                 <a:ext uri="{96DAC541-7B7A-43D3-8B79-37D633B846F1}">
-                  <asvg:svgBlip xmlns="" xmlns:asvg="http://schemas.microsoft.com/office/drawing/2016/SVG/main" r:embed="rId15"/>
+                  <asvg:svgBlip xmlns:asvg="http://schemas.microsoft.com/office/drawing/2016/SVG/main" xmlns="" r:embed="rId15"/>
                 </a:ext>
               </a:extLst>
             </a:blip>
@@ -16956,7 +16963,7 @@
             <a:blip r:embed="rId3">
               <a:extLst>
                 <a:ext uri="{96DAC541-7B7A-43D3-8B79-37D633B846F1}">
-                  <asvg:svgBlip xmlns="" xmlns:asvg="http://schemas.microsoft.com/office/drawing/2016/SVG/main" r:embed="rId4"/>
+                  <asvg:svgBlip xmlns:asvg="http://schemas.microsoft.com/office/drawing/2016/SVG/main" xmlns="" r:embed="rId4"/>
                 </a:ext>
               </a:extLst>
             </a:blip>
@@ -17400,7 +17407,7 @@
             <a:blip r:embed="rId3">
               <a:extLst>
                 <a:ext uri="{96DAC541-7B7A-43D3-8B79-37D633B846F1}">
-                  <asvg:svgBlip xmlns="" xmlns:asvg="http://schemas.microsoft.com/office/drawing/2016/SVG/main" r:embed="rId4"/>
+                  <asvg:svgBlip xmlns:asvg="http://schemas.microsoft.com/office/drawing/2016/SVG/main" xmlns="" r:embed="rId4"/>
                 </a:ext>
               </a:extLst>
             </a:blip>
@@ -18024,7 +18031,7 @@
             <a:blip r:embed="rId3">
               <a:extLst>
                 <a:ext uri="{96DAC541-7B7A-43D3-8B79-37D633B846F1}">
-                  <asvg:svgBlip xmlns="" xmlns:asvg="http://schemas.microsoft.com/office/drawing/2016/SVG/main" r:embed="rId4"/>
+                  <asvg:svgBlip xmlns:asvg="http://schemas.microsoft.com/office/drawing/2016/SVG/main" xmlns="" r:embed="rId4"/>
                 </a:ext>
               </a:extLst>
             </a:blip>
@@ -18251,7 +18258,7 @@
         </p:nvSpPr>
         <p:spPr>
           <a:xfrm>
-            <a:off x="1" y="-10"/>
+            <a:off x="0" y="14287"/>
             <a:ext cx="18288000" cy="10332922"/>
           </a:xfrm>
           <a:custGeom>
@@ -18285,58 +18292,12 @@
             <a:blip r:embed="rId3">
               <a:extLst>
                 <a:ext uri="{96DAC541-7B7A-43D3-8B79-37D633B846F1}">
-                  <asvg:svgBlip xmlns="" xmlns:asvg="http://schemas.microsoft.com/office/drawing/2016/SVG/main" r:embed="rId4"/>
+                  <asvg:svgBlip xmlns:asvg="http://schemas.microsoft.com/office/drawing/2016/SVG/main" xmlns="" r:embed="rId4"/>
                 </a:ext>
               </a:extLst>
             </a:blip>
             <a:stretch>
               <a:fillRect/>
-            </a:stretch>
-          </a:blipFill>
-        </p:spPr>
-      </p:sp>
-      <p:sp>
-        <p:nvSpPr>
-          <p:cNvPr id="2" name="Freeform 2"/>
-          <p:cNvSpPr/>
-          <p:nvPr/>
-        </p:nvSpPr>
-        <p:spPr>
-          <a:xfrm>
-            <a:off x="13106400" y="2628900"/>
-            <a:ext cx="4572000" cy="7048040"/>
-          </a:xfrm>
-          <a:custGeom>
-            <a:avLst/>
-            <a:gdLst/>
-            <a:ahLst/>
-            <a:cxnLst/>
-            <a:rect l="l" t="t" r="r" b="b"/>
-            <a:pathLst>
-              <a:path w="5354149" h="9359564">
-                <a:moveTo>
-                  <a:pt x="0" y="0"/>
-                </a:moveTo>
-                <a:lnTo>
-                  <a:pt x="5354149" y="0"/>
-                </a:lnTo>
-                <a:lnTo>
-                  <a:pt x="5354149" y="9359564"/>
-                </a:lnTo>
-                <a:lnTo>
-                  <a:pt x="0" y="9359564"/>
-                </a:lnTo>
-                <a:lnTo>
-                  <a:pt x="0" y="0"/>
-                </a:lnTo>
-                <a:close/>
-              </a:path>
-            </a:pathLst>
-          </a:custGeom>
-          <a:blipFill>
-            <a:blip r:embed="rId5"/>
-            <a:stretch>
-              <a:fillRect t="-3553" b="-1359"/>
             </a:stretch>
           </a:blipFill>
         </p:spPr>
@@ -18432,7 +18393,7 @@
           <p:nvPr/>
         </p:nvPicPr>
         <p:blipFill>
-          <a:blip r:embed="rId6" cstate="print">
+          <a:blip r:embed="rId5" cstate="print">
             <a:extLst>
               <a:ext uri="{28A0092B-C50C-407E-A947-70E740481C1C}">
                 <a14:useLocalDpi xmlns:a14="http://schemas.microsoft.com/office/drawing/2010/main" val="0"/>
@@ -18460,6 +18421,68 @@
                   <a:srgbClr val="FFFFFF"/>
                 </a:solidFill>
               </a14:hiddenFill>
+            </a:ext>
+          </a:extLst>
+        </p:spPr>
+      </p:pic>
+      <p:pic>
+        <p:nvPicPr>
+          <p:cNvPr id="2050" name="Picture 2"/>
+          <p:cNvPicPr>
+            <a:picLocks noChangeAspect="1" noChangeArrowheads="1"/>
+          </p:cNvPicPr>
+          <p:nvPr/>
+        </p:nvPicPr>
+        <p:blipFill rotWithShape="1">
+          <a:blip r:embed="rId6">
+            <a:extLst>
+              <a:ext uri="{28A0092B-C50C-407E-A947-70E740481C1C}">
+                <a14:useLocalDpi xmlns:a14="http://schemas.microsoft.com/office/drawing/2010/main" val="0"/>
+              </a:ext>
+            </a:extLst>
+          </a:blip>
+          <a:srcRect t="2997"/>
+          <a:stretch/>
+        </p:blipFill>
+        <p:spPr bwMode="auto">
+          <a:xfrm>
+            <a:off x="13544550" y="2247900"/>
+            <a:ext cx="4133850" cy="7397039"/>
+          </a:xfrm>
+          <a:prstGeom prst="rect">
+            <a:avLst/>
+          </a:prstGeom>
+          <a:noFill/>
+          <a:ln>
+            <a:noFill/>
+          </a:ln>
+          <a:effectLst/>
+          <a:extLst>
+            <a:ext uri="{909E8E84-426E-40DD-AFC4-6F175D3DCCD1}">
+              <a14:hiddenFill xmlns:a14="http://schemas.microsoft.com/office/drawing/2010/main">
+                <a:solidFill>
+                  <a:schemeClr val="accent1"/>
+                </a:solidFill>
+              </a14:hiddenFill>
+            </a:ext>
+            <a:ext uri="{91240B29-F687-4F45-9708-019B960494DF}">
+              <a14:hiddenLine xmlns:a14="http://schemas.microsoft.com/office/drawing/2010/main" w="9525">
+                <a:solidFill>
+                  <a:schemeClr val="tx1"/>
+                </a:solidFill>
+                <a:miter lim="800000"/>
+                <a:headEnd/>
+                <a:tailEnd/>
+              </a14:hiddenLine>
+            </a:ext>
+            <a:ext uri="{AF507438-7753-43E0-B8FC-AC1667EBCBE1}">
+              <a14:hiddenEffects xmlns:a14="http://schemas.microsoft.com/office/drawing/2010/main">
+                <a:effectLst>
+                  <a:outerShdw dist="35921" dir="2700000" algn="ctr" rotWithShape="0">
+                    <a:schemeClr val="bg2"/>
+                  </a:outerShdw>
+                </a:effectLst>
+              </a14:hiddenEffects>
             </a:ext>
           </a:extLst>
         </p:spPr>
@@ -18546,7 +18569,7 @@
             <a:blip r:embed="rId3">
               <a:extLst>
                 <a:ext uri="{96DAC541-7B7A-43D3-8B79-37D633B846F1}">
-                  <asvg:svgBlip xmlns="" xmlns:asvg="http://schemas.microsoft.com/office/drawing/2016/SVG/main" r:embed="rId4"/>
+                  <asvg:svgBlip xmlns:asvg="http://schemas.microsoft.com/office/drawing/2016/SVG/main" xmlns="" r:embed="rId4"/>
                 </a:ext>
               </a:extLst>
             </a:blip>
@@ -18807,7 +18830,7 @@
             <a:blip r:embed="rId3">
               <a:extLst>
                 <a:ext uri="{96DAC541-7B7A-43D3-8B79-37D633B846F1}">
-                  <asvg:svgBlip xmlns="" xmlns:asvg="http://schemas.microsoft.com/office/drawing/2016/SVG/main" r:embed="rId4"/>
+                  <asvg:svgBlip xmlns:asvg="http://schemas.microsoft.com/office/drawing/2016/SVG/main" xmlns="" r:embed="rId4"/>
                 </a:ext>
               </a:extLst>
             </a:blip>
@@ -19084,7 +19107,7 @@
             <a:blip r:embed="rId3">
               <a:extLst>
                 <a:ext uri="{96DAC541-7B7A-43D3-8B79-37D633B846F1}">
-                  <asvg:svgBlip xmlns="" xmlns:asvg="http://schemas.microsoft.com/office/drawing/2016/SVG/main" r:embed="rId4"/>
+                  <asvg:svgBlip xmlns:asvg="http://schemas.microsoft.com/office/drawing/2016/SVG/main" xmlns="" r:embed="rId4"/>
                 </a:ext>
               </a:extLst>
             </a:blip>

</xml_diff>